<commit_message>
future of the project
</commit_message>
<xml_diff>
--- a/presentation/Figure Skating at the 2018 Olympics.pptx
+++ b/presentation/Figure Skating at the 2018 Olympics.pptx
@@ -21,7 +21,8 @@
     <p:sldId id="269" r:id="rId15"/>
     <p:sldId id="270" r:id="rId16"/>
     <p:sldId id="271" r:id="rId17"/>
-    <p:sldId id="257" r:id="rId18"/>
+    <p:sldId id="273" r:id="rId18"/>
+    <p:sldId id="257" r:id="rId19"/>
   </p:sldIdLst>
   <p:sldSz cx="12192000" cy="6858000"/>
   <p:notesSz cx="6858000" cy="9144000"/>
@@ -4172,6 +4173,162 @@
           <a:bodyPr/>
           <a:lstStyle/>
           <a:p>
+            <a:r>
+              <a:rPr lang="en-US" dirty="0" smtClean="0"/>
+              <a:t>Future of the project</a:t>
+            </a:r>
+            <a:endParaRPr lang="bg-BG" dirty="0"/>
+          </a:p>
+        </p:txBody>
+      </p:sp>
+      <p:sp>
+        <p:nvSpPr>
+          <p:cNvPr id="3" name="Content Placeholder 2"/>
+          <p:cNvSpPr>
+            <a:spLocks noGrp="1"/>
+          </p:cNvSpPr>
+          <p:nvPr>
+            <p:ph idx="1"/>
+          </p:nvPr>
+        </p:nvSpPr>
+        <p:spPr>
+          <a:xfrm>
+            <a:off x="838200" y="1825625"/>
+            <a:ext cx="8068733" cy="4351338"/>
+          </a:xfrm>
+        </p:spPr>
+        <p:txBody>
+          <a:bodyPr>
+            <a:normAutofit lnSpcReduction="10000"/>
+          </a:bodyPr>
+          <a:lstStyle/>
+          <a:p>
+            <a:r>
+              <a:rPr lang="en-US" dirty="0" smtClean="0"/>
+              <a:t>Lots of data to analyze:</a:t>
+            </a:r>
+          </a:p>
+          <a:p>
+            <a:pPr lvl="1"/>
+            <a:r>
+              <a:rPr lang="en-US" dirty="0" smtClean="0"/>
+              <a:t>Jump content: # of quad jumps per program vs average point value</a:t>
+            </a:r>
+          </a:p>
+          <a:p>
+            <a:pPr lvl="1"/>
+            <a:r>
+              <a:rPr lang="en-US" dirty="0" smtClean="0"/>
+              <a:t>% of clean performances vs performances with errors</a:t>
+            </a:r>
+          </a:p>
+          <a:p>
+            <a:pPr lvl="1"/>
+            <a:r>
+              <a:rPr lang="en-US" dirty="0" smtClean="0"/>
+              <a:t>Avg. costliness of errors (negative GOE) per skater</a:t>
+            </a:r>
+          </a:p>
+          <a:p>
+            <a:pPr lvl="1"/>
+            <a:r>
+              <a:rPr lang="en-US" dirty="0" smtClean="0"/>
+              <a:t>Moment of peaking (best performances) in the season per skater</a:t>
+            </a:r>
+          </a:p>
+          <a:p>
+            <a:pPr lvl="1"/>
+            <a:r>
+              <a:rPr lang="en-US" dirty="0" smtClean="0"/>
+              <a:t>Where each skater gains most points: jumps, spins, step sequences, presentation</a:t>
+            </a:r>
+          </a:p>
+          <a:p>
+            <a:pPr lvl="1"/>
+            <a:r>
+              <a:rPr lang="en-US" dirty="0" smtClean="0"/>
+              <a:t>Strategies for maximizing points according to skaters’ strengths</a:t>
+            </a:r>
+          </a:p>
+          <a:p>
+            <a:pPr lvl="1"/>
+            <a:r>
+              <a:rPr lang="en-US" dirty="0" smtClean="0"/>
+              <a:t>Similar analysis for ladies, pairs and ice dance</a:t>
+            </a:r>
+            <a:endParaRPr lang="bg-BG" dirty="0"/>
+          </a:p>
+        </p:txBody>
+      </p:sp>
+      <p:pic>
+        <p:nvPicPr>
+          <p:cNvPr id="4" name="Picture 3"/>
+          <p:cNvPicPr>
+            <a:picLocks noChangeAspect="1"/>
+          </p:cNvPicPr>
+          <p:nvPr/>
+        </p:nvPicPr>
+        <p:blipFill>
+          <a:blip r:embed="rId2"/>
+          <a:stretch>
+            <a:fillRect/>
+          </a:stretch>
+        </p:blipFill>
+        <p:spPr>
+          <a:xfrm>
+            <a:off x="8813800" y="1367897"/>
+            <a:ext cx="2701422" cy="4597400"/>
+          </a:xfrm>
+          <a:prstGeom prst="rect">
+            <a:avLst/>
+          </a:prstGeom>
+        </p:spPr>
+      </p:pic>
+    </p:spTree>
+    <p:extLst>
+      <p:ext uri="{BB962C8B-B14F-4D97-AF65-F5344CB8AC3E}">
+        <p14:creationId xmlns:p14="http://schemas.microsoft.com/office/powerpoint/2010/main" val="2064902673"/>
+      </p:ext>
+    </p:extLst>
+  </p:cSld>
+  <p:clrMapOvr>
+    <a:masterClrMapping/>
+  </p:clrMapOvr>
+</p:sld>
+</file>
+
+<file path=ppt/slides/slide18.xml><?xml version="1.0" encoding="utf-8"?>
+<p:sld xmlns:a="http://schemas.openxmlformats.org/drawingml/2006/main" xmlns:r="http://schemas.openxmlformats.org/officeDocument/2006/relationships" xmlns:p="http://schemas.openxmlformats.org/presentationml/2006/main">
+  <p:cSld>
+    <p:spTree>
+      <p:nvGrpSpPr>
+        <p:cNvPr id="1" name=""/>
+        <p:cNvGrpSpPr/>
+        <p:nvPr/>
+      </p:nvGrpSpPr>
+      <p:grpSpPr>
+        <a:xfrm>
+          <a:off x="0" y="0"/>
+          <a:ext cx="0" cy="0"/>
+          <a:chOff x="0" y="0"/>
+          <a:chExt cx="0" cy="0"/>
+        </a:xfrm>
+      </p:grpSpPr>
+      <p:sp>
+        <p:nvSpPr>
+          <p:cNvPr id="2" name="Title 1"/>
+          <p:cNvSpPr>
+            <a:spLocks noGrp="1"/>
+          </p:cNvSpPr>
+          <p:nvPr>
+            <p:ph type="title"/>
+          </p:nvPr>
+        </p:nvSpPr>
+        <p:spPr/>
+        <p:txBody>
+          <a:bodyPr/>
+          <a:lstStyle/>
+          <a:p>
             <a:endParaRPr lang="bg-BG"/>
           </a:p>
         </p:txBody>

</xml_diff>

<commit_message>
scraped latest men, ladies, pairs, dance
</commit_message>
<xml_diff>
--- a/presentation/Figure Skating at the 2018 Olympics.pptx
+++ b/presentation/Figure Skating at the 2018 Olympics.pptx
@@ -21,8 +21,9 @@
     <p:sldId id="269" r:id="rId15"/>
     <p:sldId id="270" r:id="rId16"/>
     <p:sldId id="271" r:id="rId17"/>
-    <p:sldId id="273" r:id="rId18"/>
-    <p:sldId id="257" r:id="rId19"/>
+    <p:sldId id="274" r:id="rId18"/>
+    <p:sldId id="273" r:id="rId19"/>
+    <p:sldId id="257" r:id="rId20"/>
   </p:sldIdLst>
   <p:sldSz cx="12192000" cy="6858000"/>
   <p:notesSz cx="6858000" cy="9144000"/>
@@ -260,7 +261,7 @@
           <a:p>
             <a:fld id="{DD5903F2-E0A5-453E-B7B0-31DBEA1915F2}" type="datetimeFigureOut">
               <a:rPr lang="bg-BG" smtClean="0"/>
-              <a:t>28.1.2018 г.</a:t>
+              <a:t>1.2.2018 г.</a:t>
             </a:fld>
             <a:endParaRPr lang="bg-BG"/>
           </a:p>
@@ -430,7 +431,7 @@
           <a:p>
             <a:fld id="{DD5903F2-E0A5-453E-B7B0-31DBEA1915F2}" type="datetimeFigureOut">
               <a:rPr lang="bg-BG" smtClean="0"/>
-              <a:t>28.1.2018 г.</a:t>
+              <a:t>1.2.2018 г.</a:t>
             </a:fld>
             <a:endParaRPr lang="bg-BG"/>
           </a:p>
@@ -610,7 +611,7 @@
           <a:p>
             <a:fld id="{DD5903F2-E0A5-453E-B7B0-31DBEA1915F2}" type="datetimeFigureOut">
               <a:rPr lang="bg-BG" smtClean="0"/>
-              <a:t>28.1.2018 г.</a:t>
+              <a:t>1.2.2018 г.</a:t>
             </a:fld>
             <a:endParaRPr lang="bg-BG"/>
           </a:p>
@@ -780,7 +781,7 @@
           <a:p>
             <a:fld id="{DD5903F2-E0A5-453E-B7B0-31DBEA1915F2}" type="datetimeFigureOut">
               <a:rPr lang="bg-BG" smtClean="0"/>
-              <a:t>28.1.2018 г.</a:t>
+              <a:t>1.2.2018 г.</a:t>
             </a:fld>
             <a:endParaRPr lang="bg-BG"/>
           </a:p>
@@ -1026,7 +1027,7 @@
           <a:p>
             <a:fld id="{DD5903F2-E0A5-453E-B7B0-31DBEA1915F2}" type="datetimeFigureOut">
               <a:rPr lang="bg-BG" smtClean="0"/>
-              <a:t>28.1.2018 г.</a:t>
+              <a:t>1.2.2018 г.</a:t>
             </a:fld>
             <a:endParaRPr lang="bg-BG"/>
           </a:p>
@@ -1258,7 +1259,7 @@
           <a:p>
             <a:fld id="{DD5903F2-E0A5-453E-B7B0-31DBEA1915F2}" type="datetimeFigureOut">
               <a:rPr lang="bg-BG" smtClean="0"/>
-              <a:t>28.1.2018 г.</a:t>
+              <a:t>1.2.2018 г.</a:t>
             </a:fld>
             <a:endParaRPr lang="bg-BG"/>
           </a:p>
@@ -1625,7 +1626,7 @@
           <a:p>
             <a:fld id="{DD5903F2-E0A5-453E-B7B0-31DBEA1915F2}" type="datetimeFigureOut">
               <a:rPr lang="bg-BG" smtClean="0"/>
-              <a:t>28.1.2018 г.</a:t>
+              <a:t>1.2.2018 г.</a:t>
             </a:fld>
             <a:endParaRPr lang="bg-BG"/>
           </a:p>
@@ -1743,7 +1744,7 @@
           <a:p>
             <a:fld id="{DD5903F2-E0A5-453E-B7B0-31DBEA1915F2}" type="datetimeFigureOut">
               <a:rPr lang="bg-BG" smtClean="0"/>
-              <a:t>28.1.2018 г.</a:t>
+              <a:t>1.2.2018 г.</a:t>
             </a:fld>
             <a:endParaRPr lang="bg-BG"/>
           </a:p>
@@ -1838,7 +1839,7 @@
           <a:p>
             <a:fld id="{DD5903F2-E0A5-453E-B7B0-31DBEA1915F2}" type="datetimeFigureOut">
               <a:rPr lang="bg-BG" smtClean="0"/>
-              <a:t>28.1.2018 г.</a:t>
+              <a:t>1.2.2018 г.</a:t>
             </a:fld>
             <a:endParaRPr lang="bg-BG"/>
           </a:p>
@@ -2115,7 +2116,7 @@
           <a:p>
             <a:fld id="{DD5903F2-E0A5-453E-B7B0-31DBEA1915F2}" type="datetimeFigureOut">
               <a:rPr lang="bg-BG" smtClean="0"/>
-              <a:t>28.1.2018 г.</a:t>
+              <a:t>1.2.2018 г.</a:t>
             </a:fld>
             <a:endParaRPr lang="bg-BG"/>
           </a:p>
@@ -2368,7 +2369,7 @@
           <a:p>
             <a:fld id="{DD5903F2-E0A5-453E-B7B0-31DBEA1915F2}" type="datetimeFigureOut">
               <a:rPr lang="bg-BG" smtClean="0"/>
-              <a:t>28.1.2018 г.</a:t>
+              <a:t>1.2.2018 г.</a:t>
             </a:fld>
             <a:endParaRPr lang="bg-BG"/>
           </a:p>
@@ -2581,7 +2582,7 @@
           <a:p>
             <a:fld id="{DD5903F2-E0A5-453E-B7B0-31DBEA1915F2}" type="datetimeFigureOut">
               <a:rPr lang="bg-BG" smtClean="0"/>
-              <a:t>28.1.2018 г.</a:t>
+              <a:t>1.2.2018 г.</a:t>
             </a:fld>
             <a:endParaRPr lang="bg-BG"/>
           </a:p>
@@ -4175,6 +4176,144 @@
           <a:p>
             <a:r>
               <a:rPr lang="en-US" dirty="0" smtClean="0"/>
+              <a:t>Possible applications of the project</a:t>
+            </a:r>
+            <a:endParaRPr lang="bg-BG" dirty="0"/>
+          </a:p>
+        </p:txBody>
+      </p:sp>
+      <p:sp>
+        <p:nvSpPr>
+          <p:cNvPr id="3" name="Content Placeholder 2"/>
+          <p:cNvSpPr>
+            <a:spLocks noGrp="1"/>
+          </p:cNvSpPr>
+          <p:nvPr>
+            <p:ph idx="1"/>
+          </p:nvPr>
+        </p:nvSpPr>
+        <p:spPr>
+          <a:xfrm>
+            <a:off x="4546600" y="1825625"/>
+            <a:ext cx="6807199" cy="4351338"/>
+          </a:xfrm>
+        </p:spPr>
+        <p:txBody>
+          <a:bodyPr/>
+          <a:lstStyle/>
+          <a:p>
+            <a:r>
+              <a:rPr lang="en-US" dirty="0" smtClean="0"/>
+              <a:t>Analysis and predictions of skaters performance can make naming to the Worlds / Olympic team easier for skating federations which want to take into account factors other than placement at Nationals</a:t>
+            </a:r>
+          </a:p>
+          <a:p>
+            <a:pPr lvl="1"/>
+            <a:r>
+              <a:rPr lang="en-US" dirty="0" smtClean="0"/>
+              <a:t>USFSA controversial passing of silver medalist Ross Miner for Worlds and Olympic team in 2018</a:t>
+            </a:r>
+          </a:p>
+          <a:p>
+            <a:r>
+              <a:rPr lang="en-US" dirty="0" err="1" smtClean="0"/>
+              <a:t>Maximise</a:t>
+            </a:r>
+            <a:r>
+              <a:rPr lang="en-US" dirty="0" smtClean="0"/>
+              <a:t> Olympic Team Event chances</a:t>
+            </a:r>
+          </a:p>
+        </p:txBody>
+      </p:sp>
+      <p:pic>
+        <p:nvPicPr>
+          <p:cNvPr id="1026" name="Picture 2" descr="Related image"/>
+          <p:cNvPicPr>
+            <a:picLocks noChangeAspect="1" noChangeArrowheads="1"/>
+          </p:cNvPicPr>
+          <p:nvPr/>
+        </p:nvPicPr>
+        <p:blipFill>
+          <a:blip r:embed="rId2">
+            <a:extLst>
+              <a:ext uri="{28A0092B-C50C-407E-A947-70E740481C1C}">
+                <a14:useLocalDpi xmlns:a14="http://schemas.microsoft.com/office/drawing/2010/main" val="0"/>
+              </a:ext>
+            </a:extLst>
+          </a:blip>
+          <a:srcRect/>
+          <a:stretch>
+            <a:fillRect/>
+          </a:stretch>
+        </p:blipFill>
+        <p:spPr bwMode="auto">
+          <a:xfrm>
+            <a:off x="985308" y="1690688"/>
+            <a:ext cx="3132667" cy="4699000"/>
+          </a:xfrm>
+          <a:prstGeom prst="rect">
+            <a:avLst/>
+          </a:prstGeom>
+          <a:noFill/>
+          <a:extLst>
+            <a:ext uri="{909E8E84-426E-40DD-AFC4-6F175D3DCCD1}">
+              <a14:hiddenFill xmlns:a14="http://schemas.microsoft.com/office/drawing/2010/main">
+                <a:solidFill>
+                  <a:srgbClr val="FFFFFF"/>
+                </a:solidFill>
+              </a14:hiddenFill>
+            </a:ext>
+          </a:extLst>
+        </p:spPr>
+      </p:pic>
+    </p:spTree>
+    <p:extLst>
+      <p:ext uri="{BB962C8B-B14F-4D97-AF65-F5344CB8AC3E}">
+        <p14:creationId xmlns:p14="http://schemas.microsoft.com/office/powerpoint/2010/main" val="2516097867"/>
+      </p:ext>
+    </p:extLst>
+  </p:cSld>
+  <p:clrMapOvr>
+    <a:masterClrMapping/>
+  </p:clrMapOvr>
+</p:sld>
+</file>
+
+<file path=ppt/slides/slide18.xml><?xml version="1.0" encoding="utf-8"?>
+<p:sld xmlns:a="http://schemas.openxmlformats.org/drawingml/2006/main" xmlns:r="http://schemas.openxmlformats.org/officeDocument/2006/relationships" xmlns:p="http://schemas.openxmlformats.org/presentationml/2006/main">
+  <p:cSld>
+    <p:spTree>
+      <p:nvGrpSpPr>
+        <p:cNvPr id="1" name=""/>
+        <p:cNvGrpSpPr/>
+        <p:nvPr/>
+      </p:nvGrpSpPr>
+      <p:grpSpPr>
+        <a:xfrm>
+          <a:off x="0" y="0"/>
+          <a:ext cx="0" cy="0"/>
+          <a:chOff x="0" y="0"/>
+          <a:chExt cx="0" cy="0"/>
+        </a:xfrm>
+      </p:grpSpPr>
+      <p:sp>
+        <p:nvSpPr>
+          <p:cNvPr id="2" name="Title 1"/>
+          <p:cNvSpPr>
+            <a:spLocks noGrp="1"/>
+          </p:cNvSpPr>
+          <p:nvPr>
+            <p:ph type="title"/>
+          </p:nvPr>
+        </p:nvSpPr>
+        <p:spPr/>
+        <p:txBody>
+          <a:bodyPr/>
+          <a:lstStyle/>
+          <a:p>
+            <a:r>
+              <a:rPr lang="en-US" dirty="0" smtClean="0"/>
               <a:t>Future of the project</a:t>
             </a:r>
             <a:endParaRPr lang="bg-BG" dirty="0"/>
@@ -4199,7 +4338,7 @@
         </p:spPr>
         <p:txBody>
           <a:bodyPr>
-            <a:normAutofit lnSpcReduction="10000"/>
+            <a:normAutofit/>
           </a:bodyPr>
           <a:lstStyle/>
           <a:p>
@@ -4212,8 +4351,9 @@
             <a:pPr lvl="1"/>
             <a:r>
               <a:rPr lang="en-US" dirty="0" smtClean="0"/>
-              <a:t>Jump content: # of quad jumps per program vs average point value</a:t>
-            </a:r>
+              <a:t>Group skaters according to ability</a:t>
+            </a:r>
+            <a:endParaRPr lang="en-US" dirty="0" smtClean="0"/>
           </a:p>
           <a:p>
             <a:pPr lvl="1"/>
@@ -4297,7 +4437,7 @@
 </p:sld>
 </file>
 
-<file path=ppt/slides/slide18.xml><?xml version="1.0" encoding="utf-8"?>
+<file path=ppt/slides/slide19.xml><?xml version="1.0" encoding="utf-8"?>
 <p:sld xmlns:a="http://schemas.openxmlformats.org/drawingml/2006/main" xmlns:r="http://schemas.openxmlformats.org/officeDocument/2006/relationships" xmlns:p="http://schemas.openxmlformats.org/presentationml/2006/main">
   <p:cSld>
     <p:spTree>

</xml_diff>

<commit_message>
regression rankings for the 4 disciplines
</commit_message>
<xml_diff>
--- a/presentation/Figure Skating at the 2018 Olympics.pptx
+++ b/presentation/Figure Skating at the 2018 Olympics.pptx
@@ -261,7 +261,7 @@
           <a:p>
             <a:fld id="{DD5903F2-E0A5-453E-B7B0-31DBEA1915F2}" type="datetimeFigureOut">
               <a:rPr lang="bg-BG" smtClean="0"/>
-              <a:t>1.2.2018 г.</a:t>
+              <a:t>2.2.2018 г.</a:t>
             </a:fld>
             <a:endParaRPr lang="bg-BG"/>
           </a:p>
@@ -431,7 +431,7 @@
           <a:p>
             <a:fld id="{DD5903F2-E0A5-453E-B7B0-31DBEA1915F2}" type="datetimeFigureOut">
               <a:rPr lang="bg-BG" smtClean="0"/>
-              <a:t>1.2.2018 г.</a:t>
+              <a:t>2.2.2018 г.</a:t>
             </a:fld>
             <a:endParaRPr lang="bg-BG"/>
           </a:p>
@@ -611,7 +611,7 @@
           <a:p>
             <a:fld id="{DD5903F2-E0A5-453E-B7B0-31DBEA1915F2}" type="datetimeFigureOut">
               <a:rPr lang="bg-BG" smtClean="0"/>
-              <a:t>1.2.2018 г.</a:t>
+              <a:t>2.2.2018 г.</a:t>
             </a:fld>
             <a:endParaRPr lang="bg-BG"/>
           </a:p>
@@ -781,7 +781,7 @@
           <a:p>
             <a:fld id="{DD5903F2-E0A5-453E-B7B0-31DBEA1915F2}" type="datetimeFigureOut">
               <a:rPr lang="bg-BG" smtClean="0"/>
-              <a:t>1.2.2018 г.</a:t>
+              <a:t>2.2.2018 г.</a:t>
             </a:fld>
             <a:endParaRPr lang="bg-BG"/>
           </a:p>
@@ -1027,7 +1027,7 @@
           <a:p>
             <a:fld id="{DD5903F2-E0A5-453E-B7B0-31DBEA1915F2}" type="datetimeFigureOut">
               <a:rPr lang="bg-BG" smtClean="0"/>
-              <a:t>1.2.2018 г.</a:t>
+              <a:t>2.2.2018 г.</a:t>
             </a:fld>
             <a:endParaRPr lang="bg-BG"/>
           </a:p>
@@ -1259,7 +1259,7 @@
           <a:p>
             <a:fld id="{DD5903F2-E0A5-453E-B7B0-31DBEA1915F2}" type="datetimeFigureOut">
               <a:rPr lang="bg-BG" smtClean="0"/>
-              <a:t>1.2.2018 г.</a:t>
+              <a:t>2.2.2018 г.</a:t>
             </a:fld>
             <a:endParaRPr lang="bg-BG"/>
           </a:p>
@@ -1626,7 +1626,7 @@
           <a:p>
             <a:fld id="{DD5903F2-E0A5-453E-B7B0-31DBEA1915F2}" type="datetimeFigureOut">
               <a:rPr lang="bg-BG" smtClean="0"/>
-              <a:t>1.2.2018 г.</a:t>
+              <a:t>2.2.2018 г.</a:t>
             </a:fld>
             <a:endParaRPr lang="bg-BG"/>
           </a:p>
@@ -1744,7 +1744,7 @@
           <a:p>
             <a:fld id="{DD5903F2-E0A5-453E-B7B0-31DBEA1915F2}" type="datetimeFigureOut">
               <a:rPr lang="bg-BG" smtClean="0"/>
-              <a:t>1.2.2018 г.</a:t>
+              <a:t>2.2.2018 г.</a:t>
             </a:fld>
             <a:endParaRPr lang="bg-BG"/>
           </a:p>
@@ -1839,7 +1839,7 @@
           <a:p>
             <a:fld id="{DD5903F2-E0A5-453E-B7B0-31DBEA1915F2}" type="datetimeFigureOut">
               <a:rPr lang="bg-BG" smtClean="0"/>
-              <a:t>1.2.2018 г.</a:t>
+              <a:t>2.2.2018 г.</a:t>
             </a:fld>
             <a:endParaRPr lang="bg-BG"/>
           </a:p>
@@ -2116,7 +2116,7 @@
           <a:p>
             <a:fld id="{DD5903F2-E0A5-453E-B7B0-31DBEA1915F2}" type="datetimeFigureOut">
               <a:rPr lang="bg-BG" smtClean="0"/>
-              <a:t>1.2.2018 г.</a:t>
+              <a:t>2.2.2018 г.</a:t>
             </a:fld>
             <a:endParaRPr lang="bg-BG"/>
           </a:p>
@@ -2369,7 +2369,7 @@
           <a:p>
             <a:fld id="{DD5903F2-E0A5-453E-B7B0-31DBEA1915F2}" type="datetimeFigureOut">
               <a:rPr lang="bg-BG" smtClean="0"/>
-              <a:t>1.2.2018 г.</a:t>
+              <a:t>2.2.2018 г.</a:t>
             </a:fld>
             <a:endParaRPr lang="bg-BG"/>
           </a:p>
@@ -2582,7 +2582,7 @@
           <a:p>
             <a:fld id="{DD5903F2-E0A5-453E-B7B0-31DBEA1915F2}" type="datetimeFigureOut">
               <a:rPr lang="bg-BG" smtClean="0"/>
-              <a:t>1.2.2018 г.</a:t>
+              <a:t>2.2.2018 г.</a:t>
             </a:fld>
             <a:endParaRPr lang="bg-BG"/>
           </a:p>
@@ -4011,8 +4011,8 @@
         </p:blipFill>
         <p:spPr bwMode="auto">
           <a:xfrm>
-            <a:off x="1838325" y="4869891"/>
-            <a:ext cx="2525531" cy="1683687"/>
+            <a:off x="5073740" y="4621377"/>
+            <a:ext cx="2728914" cy="1819275"/>
           </a:xfrm>
           <a:prstGeom prst="rect">
             <a:avLst/>
@@ -4037,7 +4037,7 @@
         </p:nvSpPr>
         <p:spPr>
           <a:xfrm>
-            <a:off x="4572000" y="5111569"/>
+            <a:off x="7926206" y="4976634"/>
             <a:ext cx="3656194" cy="1200329"/>
           </a:xfrm>
           <a:prstGeom prst="rect">
@@ -4107,7 +4107,7 @@
       </p:sp>
       <p:pic>
         <p:nvPicPr>
-          <p:cNvPr id="8" name="Picture 7"/>
+          <p:cNvPr id="5" name="Picture 4"/>
           <p:cNvPicPr>
             <a:picLocks noChangeAspect="1"/>
           </p:cNvPicPr>
@@ -4121,8 +4121,80 @@
         </p:blipFill>
         <p:spPr>
           <a:xfrm>
-            <a:off x="1314450" y="2407301"/>
-            <a:ext cx="9372600" cy="2085975"/>
+            <a:off x="3693583" y="2438121"/>
+            <a:ext cx="2505075" cy="1819275"/>
+          </a:xfrm>
+          <a:prstGeom prst="rect">
+            <a:avLst/>
+          </a:prstGeom>
+        </p:spPr>
+      </p:pic>
+      <p:pic>
+        <p:nvPicPr>
+          <p:cNvPr id="6" name="Picture 5"/>
+          <p:cNvPicPr>
+            <a:picLocks noChangeAspect="1"/>
+          </p:cNvPicPr>
+          <p:nvPr/>
+        </p:nvPicPr>
+        <p:blipFill>
+          <a:blip r:embed="rId4"/>
+          <a:stretch>
+            <a:fillRect/>
+          </a:stretch>
+        </p:blipFill>
+        <p:spPr>
+          <a:xfrm>
+            <a:off x="1022879" y="2438121"/>
+            <a:ext cx="2486025" cy="1819275"/>
+          </a:xfrm>
+          <a:prstGeom prst="rect">
+            <a:avLst/>
+          </a:prstGeom>
+        </p:spPr>
+      </p:pic>
+      <p:pic>
+        <p:nvPicPr>
+          <p:cNvPr id="9" name="Picture 8"/>
+          <p:cNvPicPr>
+            <a:picLocks noChangeAspect="1"/>
+          </p:cNvPicPr>
+          <p:nvPr/>
+        </p:nvPicPr>
+        <p:blipFill>
+          <a:blip r:embed="rId5"/>
+          <a:stretch>
+            <a:fillRect/>
+          </a:stretch>
+        </p:blipFill>
+        <p:spPr>
+          <a:xfrm>
+            <a:off x="6438197" y="2438121"/>
+            <a:ext cx="3657600" cy="1819275"/>
+          </a:xfrm>
+          <a:prstGeom prst="rect">
+            <a:avLst/>
+          </a:prstGeom>
+        </p:spPr>
+      </p:pic>
+      <p:pic>
+        <p:nvPicPr>
+          <p:cNvPr id="10" name="Picture 9"/>
+          <p:cNvPicPr>
+            <a:picLocks noChangeAspect="1"/>
+          </p:cNvPicPr>
+          <p:nvPr/>
+        </p:nvPicPr>
+        <p:blipFill>
+          <a:blip r:embed="rId6"/>
+          <a:stretch>
+            <a:fillRect/>
+          </a:stretch>
+        </p:blipFill>
+        <p:spPr>
+          <a:xfrm>
+            <a:off x="838200" y="4621377"/>
+            <a:ext cx="3895725" cy="1819275"/>
           </a:xfrm>
           <a:prstGeom prst="rect">
             <a:avLst/>
@@ -4353,7 +4425,6 @@
               <a:rPr lang="en-US" dirty="0" smtClean="0"/>
               <a:t>Group skaters according to ability</a:t>
             </a:r>
-            <a:endParaRPr lang="en-US" dirty="0" smtClean="0"/>
           </a:p>
           <a:p>
             <a:pPr lvl="1"/>

</xml_diff>

<commit_message>
means refactored and updated
</commit_message>
<xml_diff>
--- a/presentation/Figure Skating at the 2018 Olympics.pptx
+++ b/presentation/Figure Skating at the 2018 Olympics.pptx
@@ -12,19 +12,18 @@
     <p:sldId id="261" r:id="rId6"/>
     <p:sldId id="262" r:id="rId7"/>
     <p:sldId id="263" r:id="rId8"/>
-    <p:sldId id="264" r:id="rId9"/>
-    <p:sldId id="265" r:id="rId10"/>
-    <p:sldId id="272" r:id="rId11"/>
-    <p:sldId id="275" r:id="rId12"/>
-    <p:sldId id="266" r:id="rId13"/>
-    <p:sldId id="267" r:id="rId14"/>
-    <p:sldId id="268" r:id="rId15"/>
-    <p:sldId id="269" r:id="rId16"/>
-    <p:sldId id="270" r:id="rId17"/>
-    <p:sldId id="271" r:id="rId18"/>
-    <p:sldId id="274" r:id="rId19"/>
-    <p:sldId id="273" r:id="rId20"/>
-    <p:sldId id="257" r:id="rId21"/>
+    <p:sldId id="276" r:id="rId9"/>
+    <p:sldId id="272" r:id="rId10"/>
+    <p:sldId id="275" r:id="rId11"/>
+    <p:sldId id="266" r:id="rId12"/>
+    <p:sldId id="267" r:id="rId13"/>
+    <p:sldId id="268" r:id="rId14"/>
+    <p:sldId id="269" r:id="rId15"/>
+    <p:sldId id="270" r:id="rId16"/>
+    <p:sldId id="271" r:id="rId17"/>
+    <p:sldId id="274" r:id="rId18"/>
+    <p:sldId id="273" r:id="rId19"/>
+    <p:sldId id="257" r:id="rId20"/>
   </p:sldIdLst>
   <p:sldSz cx="12192000" cy="6858000"/>
   <p:notesSz cx="6858000" cy="9144000"/>
@@ -3095,6 +3094,45 @@
           </a:extLst>
         </p:spPr>
       </p:pic>
+      <p:sp>
+        <p:nvSpPr>
+          <p:cNvPr id="4" name="TextBox 3"/>
+          <p:cNvSpPr txBox="1"/>
+          <p:nvPr/>
+        </p:nvSpPr>
+        <p:spPr>
+          <a:xfrm>
+            <a:off x="8839200" y="5887453"/>
+            <a:ext cx="2614863" cy="369332"/>
+          </a:xfrm>
+          <a:prstGeom prst="rect">
+            <a:avLst/>
+          </a:prstGeom>
+          <a:noFill/>
+        </p:spPr>
+        <p:txBody>
+          <a:bodyPr wrap="square" rtlCol="0">
+            <a:spAutoFit/>
+          </a:bodyPr>
+          <a:lstStyle/>
+          <a:p>
+            <a:pPr algn="r"/>
+            <a:r>
+              <a:rPr lang="en-US" dirty="0" smtClean="0"/>
+              <a:t>Nina </a:t>
+            </a:r>
+            <a:r>
+              <a:rPr lang="en-US" dirty="0" err="1" smtClean="0"/>
+              <a:t>Anatchkova</a:t>
+            </a:r>
+            <a:r>
+              <a:rPr lang="en-US" dirty="0" smtClean="0"/>
+              <a:t>, 25564</a:t>
+            </a:r>
+            <a:endParaRPr lang="bg-BG" dirty="0"/>
+          </a:p>
+        </p:txBody>
+      </p:sp>
     </p:spTree>
     <p:extLst>
       <p:ext uri="{BB962C8B-B14F-4D97-AF65-F5344CB8AC3E}">
@@ -3109,107 +3147,6 @@
 </file>
 
 <file path=ppt/slides/slide10.xml><?xml version="1.0" encoding="utf-8"?>
-<p:sld xmlns:a="http://schemas.openxmlformats.org/drawingml/2006/main" xmlns:r="http://schemas.openxmlformats.org/officeDocument/2006/relationships" xmlns:p="http://schemas.openxmlformats.org/presentationml/2006/main">
-  <p:cSld>
-    <p:spTree>
-      <p:nvGrpSpPr>
-        <p:cNvPr id="1" name=""/>
-        <p:cNvGrpSpPr/>
-        <p:nvPr/>
-      </p:nvGrpSpPr>
-      <p:grpSpPr>
-        <a:xfrm>
-          <a:off x="0" y="0"/>
-          <a:ext cx="0" cy="0"/>
-          <a:chOff x="0" y="0"/>
-          <a:chExt cx="0" cy="0"/>
-        </a:xfrm>
-      </p:grpSpPr>
-      <p:sp>
-        <p:nvSpPr>
-          <p:cNvPr id="2" name="Title 1"/>
-          <p:cNvSpPr>
-            <a:spLocks noGrp="1"/>
-          </p:cNvSpPr>
-          <p:nvPr>
-            <p:ph type="title"/>
-          </p:nvPr>
-        </p:nvSpPr>
-        <p:spPr/>
-        <p:txBody>
-          <a:bodyPr/>
-          <a:lstStyle/>
-          <a:p>
-            <a:r>
-              <a:rPr lang="en-US" dirty="0" smtClean="0"/>
-              <a:t>Methods: Box Plot</a:t>
-            </a:r>
-            <a:endParaRPr lang="bg-BG" dirty="0"/>
-          </a:p>
-        </p:txBody>
-      </p:sp>
-      <p:pic>
-        <p:nvPicPr>
-          <p:cNvPr id="3" name="Picture 2"/>
-          <p:cNvPicPr>
-            <a:picLocks noChangeAspect="1"/>
-          </p:cNvPicPr>
-          <p:nvPr/>
-        </p:nvPicPr>
-        <p:blipFill>
-          <a:blip r:embed="rId2"/>
-          <a:stretch>
-            <a:fillRect/>
-          </a:stretch>
-        </p:blipFill>
-        <p:spPr>
-          <a:xfrm>
-            <a:off x="904483" y="1690688"/>
-            <a:ext cx="5191517" cy="4306832"/>
-          </a:xfrm>
-          <a:prstGeom prst="rect">
-            <a:avLst/>
-          </a:prstGeom>
-        </p:spPr>
-      </p:pic>
-      <p:pic>
-        <p:nvPicPr>
-          <p:cNvPr id="8" name="Picture 7"/>
-          <p:cNvPicPr>
-            <a:picLocks noChangeAspect="1"/>
-          </p:cNvPicPr>
-          <p:nvPr/>
-        </p:nvPicPr>
-        <p:blipFill>
-          <a:blip r:embed="rId3"/>
-          <a:stretch>
-            <a:fillRect/>
-          </a:stretch>
-        </p:blipFill>
-        <p:spPr>
-          <a:xfrm>
-            <a:off x="6228566" y="1690688"/>
-            <a:ext cx="5191517" cy="4306832"/>
-          </a:xfrm>
-          <a:prstGeom prst="rect">
-            <a:avLst/>
-          </a:prstGeom>
-        </p:spPr>
-      </p:pic>
-    </p:spTree>
-    <p:extLst>
-      <p:ext uri="{BB962C8B-B14F-4D97-AF65-F5344CB8AC3E}">
-        <p14:creationId xmlns:p14="http://schemas.microsoft.com/office/powerpoint/2010/main" val="1707265198"/>
-      </p:ext>
-    </p:extLst>
-  </p:cSld>
-  <p:clrMapOvr>
-    <a:masterClrMapping/>
-  </p:clrMapOvr>
-</p:sld>
-</file>
-
-<file path=ppt/slides/slide11.xml><?xml version="1.0" encoding="utf-8"?>
 <p:sld xmlns:a="http://schemas.openxmlformats.org/drawingml/2006/main" xmlns:r="http://schemas.openxmlformats.org/officeDocument/2006/relationships" xmlns:p="http://schemas.openxmlformats.org/presentationml/2006/main">
   <p:cSld>
     <p:spTree>
@@ -3296,7 +3233,7 @@
         </p:blipFill>
         <p:spPr bwMode="auto">
           <a:xfrm>
-            <a:off x="1244600" y="1876232"/>
+            <a:off x="1151468" y="1866951"/>
             <a:ext cx="2983442" cy="3977923"/>
           </a:xfrm>
           <a:prstGeom prst="rect">
@@ -3327,7 +3264,7 @@
 </p:sld>
 </file>
 
-<file path=ppt/slides/slide12.xml><?xml version="1.0" encoding="utf-8"?>
+<file path=ppt/slides/slide11.xml><?xml version="1.0" encoding="utf-8"?>
 <p:sld xmlns:a="http://schemas.openxmlformats.org/drawingml/2006/main" xmlns:r="http://schemas.openxmlformats.org/officeDocument/2006/relationships" xmlns:p="http://schemas.openxmlformats.org/presentationml/2006/main">
   <p:cSld>
     <p:spTree>
@@ -3361,11 +3298,7 @@
           <a:p>
             <a:r>
               <a:rPr lang="en-US" dirty="0" smtClean="0"/>
-              <a:t>Methods: </a:t>
-            </a:r>
-            <a:r>
-              <a:rPr lang="en-US" dirty="0" smtClean="0"/>
-              <a:t>Linear Regression</a:t>
+              <a:t>Methods: Linear Regression</a:t>
             </a:r>
             <a:endParaRPr lang="bg-BG" dirty="0"/>
           </a:p>
@@ -3490,7 +3423,7 @@
 </p:sld>
 </file>
 
-<file path=ppt/slides/slide13.xml><?xml version="1.0" encoding="utf-8"?>
+<file path=ppt/slides/slide12.xml><?xml version="1.0" encoding="utf-8"?>
 <p:sld xmlns:a="http://schemas.openxmlformats.org/drawingml/2006/main" xmlns:r="http://schemas.openxmlformats.org/officeDocument/2006/relationships" xmlns:p="http://schemas.openxmlformats.org/presentationml/2006/main">
   <p:cSld>
     <p:spTree>
@@ -3612,7 +3545,7 @@
 </p:sld>
 </file>
 
-<file path=ppt/slides/slide14.xml><?xml version="1.0" encoding="utf-8"?>
+<file path=ppt/slides/slide13.xml><?xml version="1.0" encoding="utf-8"?>
 <p:sld xmlns:a="http://schemas.openxmlformats.org/drawingml/2006/main" xmlns:r="http://schemas.openxmlformats.org/officeDocument/2006/relationships" xmlns:p="http://schemas.openxmlformats.org/presentationml/2006/main">
   <p:cSld>
     <p:spTree>
@@ -3734,7 +3667,7 @@
 </p:sld>
 </file>
 
-<file path=ppt/slides/slide15.xml><?xml version="1.0" encoding="utf-8"?>
+<file path=ppt/slides/slide14.xml><?xml version="1.0" encoding="utf-8"?>
 <p:sld xmlns:a="http://schemas.openxmlformats.org/drawingml/2006/main" xmlns:r="http://schemas.openxmlformats.org/officeDocument/2006/relationships" xmlns:p="http://schemas.openxmlformats.org/presentationml/2006/main">
   <p:cSld>
     <p:spTree>
@@ -3868,7 +3801,7 @@
 </p:sld>
 </file>
 
-<file path=ppt/slides/slide16.xml><?xml version="1.0" encoding="utf-8"?>
+<file path=ppt/slides/slide15.xml><?xml version="1.0" encoding="utf-8"?>
 <p:sld xmlns:a="http://schemas.openxmlformats.org/drawingml/2006/main" xmlns:r="http://schemas.openxmlformats.org/officeDocument/2006/relationships" xmlns:p="http://schemas.openxmlformats.org/presentationml/2006/main">
   <p:cSld>
     <p:spTree>
@@ -3994,7 +3927,7 @@
 </p:sld>
 </file>
 
-<file path=ppt/slides/slide17.xml><?xml version="1.0" encoding="utf-8"?>
+<file path=ppt/slides/slide16.xml><?xml version="1.0" encoding="utf-8"?>
 <p:sld xmlns:a="http://schemas.openxmlformats.org/drawingml/2006/main" xmlns:r="http://schemas.openxmlformats.org/officeDocument/2006/relationships" xmlns:p="http://schemas.openxmlformats.org/presentationml/2006/main">
   <p:cSld>
     <p:spTree>
@@ -4285,7 +4218,7 @@
 </p:sld>
 </file>
 
-<file path=ppt/slides/slide18.xml><?xml version="1.0" encoding="utf-8"?>
+<file path=ppt/slides/slide17.xml><?xml version="1.0" encoding="utf-8"?>
 <p:sld xmlns:a="http://schemas.openxmlformats.org/drawingml/2006/main" xmlns:r="http://schemas.openxmlformats.org/officeDocument/2006/relationships" xmlns:p="http://schemas.openxmlformats.org/presentationml/2006/main">
   <p:cSld>
     <p:spTree>
@@ -4423,7 +4356,7 @@
 </p:sld>
 </file>
 
-<file path=ppt/slides/slide19.xml><?xml version="1.0" encoding="utf-8"?>
+<file path=ppt/slides/slide18.xml><?xml version="1.0" encoding="utf-8"?>
 <p:sld xmlns:a="http://schemas.openxmlformats.org/drawingml/2006/main" xmlns:r="http://schemas.openxmlformats.org/officeDocument/2006/relationships" xmlns:p="http://schemas.openxmlformats.org/presentationml/2006/main">
   <p:cSld>
     <p:spTree>
@@ -4579,6 +4512,151 @@
 </p:sld>
 </file>
 
+<file path=ppt/slides/slide19.xml><?xml version="1.0" encoding="utf-8"?>
+<p:sld xmlns:a="http://schemas.openxmlformats.org/drawingml/2006/main" xmlns:r="http://schemas.openxmlformats.org/officeDocument/2006/relationships" xmlns:p="http://schemas.openxmlformats.org/presentationml/2006/main">
+  <p:cSld>
+    <p:spTree>
+      <p:nvGrpSpPr>
+        <p:cNvPr id="1" name=""/>
+        <p:cNvGrpSpPr/>
+        <p:nvPr/>
+      </p:nvGrpSpPr>
+      <p:grpSpPr>
+        <a:xfrm>
+          <a:off x="0" y="0"/>
+          <a:ext cx="0" cy="0"/>
+          <a:chOff x="0" y="0"/>
+          <a:chExt cx="0" cy="0"/>
+        </a:xfrm>
+      </p:grpSpPr>
+      <p:sp>
+        <p:nvSpPr>
+          <p:cNvPr id="2" name="Title 1"/>
+          <p:cNvSpPr>
+            <a:spLocks noGrp="1"/>
+          </p:cNvSpPr>
+          <p:nvPr>
+            <p:ph type="title"/>
+          </p:nvPr>
+        </p:nvSpPr>
+        <p:spPr/>
+        <p:txBody>
+          <a:bodyPr/>
+          <a:lstStyle/>
+          <a:p>
+            <a:endParaRPr lang="bg-BG"/>
+          </a:p>
+        </p:txBody>
+      </p:sp>
+      <p:sp>
+        <p:nvSpPr>
+          <p:cNvPr id="3" name="Content Placeholder 2"/>
+          <p:cNvSpPr>
+            <a:spLocks noGrp="1"/>
+          </p:cNvSpPr>
+          <p:nvPr>
+            <p:ph idx="1"/>
+          </p:nvPr>
+        </p:nvSpPr>
+        <p:spPr/>
+        <p:txBody>
+          <a:bodyPr/>
+          <a:lstStyle/>
+          <a:p>
+            <a:endParaRPr lang="bg-BG"/>
+          </a:p>
+        </p:txBody>
+      </p:sp>
+      <p:pic>
+        <p:nvPicPr>
+          <p:cNvPr id="3074" name="Picture 2" descr="Related image"/>
+          <p:cNvPicPr>
+            <a:picLocks noChangeAspect="1" noChangeArrowheads="1"/>
+          </p:cNvPicPr>
+          <p:nvPr/>
+        </p:nvPicPr>
+        <p:blipFill rotWithShape="1">
+          <a:blip r:embed="rId2">
+            <a:extLst>
+              <a:ext uri="{28A0092B-C50C-407E-A947-70E740481C1C}">
+                <a14:useLocalDpi xmlns:a14="http://schemas.microsoft.com/office/drawing/2010/main" val="0"/>
+              </a:ext>
+            </a:extLst>
+          </a:blip>
+          <a:srcRect b="-84"/>
+          <a:stretch/>
+        </p:blipFill>
+        <p:spPr bwMode="auto">
+          <a:xfrm>
+            <a:off x="0" y="0"/>
+            <a:ext cx="13445569" cy="7020000"/>
+          </a:xfrm>
+          <a:prstGeom prst="rect">
+            <a:avLst/>
+          </a:prstGeom>
+          <a:extLst>
+            <a:ext uri="{909E8E84-426E-40DD-AFC4-6F175D3DCCD1}">
+              <a14:hiddenFill xmlns:a14="http://schemas.microsoft.com/office/drawing/2010/main">
+                <a:solidFill>
+                  <a:srgbClr val="FFFFFF"/>
+                </a:solidFill>
+              </a14:hiddenFill>
+            </a:ext>
+          </a:extLst>
+        </p:spPr>
+      </p:pic>
+      <p:sp>
+        <p:nvSpPr>
+          <p:cNvPr id="4" name="TextBox 3"/>
+          <p:cNvSpPr txBox="1"/>
+          <p:nvPr/>
+        </p:nvSpPr>
+        <p:spPr>
+          <a:xfrm>
+            <a:off x="3141384" y="625296"/>
+            <a:ext cx="7162800" cy="1200329"/>
+          </a:xfrm>
+          <a:prstGeom prst="rect">
+            <a:avLst/>
+          </a:prstGeom>
+          <a:noFill/>
+        </p:spPr>
+        <p:txBody>
+          <a:bodyPr wrap="square" rtlCol="0">
+            <a:spAutoFit/>
+          </a:bodyPr>
+          <a:lstStyle/>
+          <a:p>
+            <a:pPr algn="ctr"/>
+            <a:r>
+              <a:rPr lang="en-US" sz="7200" dirty="0" smtClean="0">
+                <a:solidFill>
+                  <a:schemeClr val="bg1"/>
+                </a:solidFill>
+              </a:rPr>
+              <a:t>Thank you!</a:t>
+            </a:r>
+            <a:endParaRPr lang="bg-BG" sz="7200" dirty="0">
+              <a:solidFill>
+                <a:schemeClr val="bg1"/>
+              </a:solidFill>
+            </a:endParaRPr>
+          </a:p>
+        </p:txBody>
+      </p:sp>
+    </p:spTree>
+    <p:extLst>
+      <p:ext uri="{BB962C8B-B14F-4D97-AF65-F5344CB8AC3E}">
+        <p14:creationId xmlns:p14="http://schemas.microsoft.com/office/powerpoint/2010/main" val="2704833015"/>
+      </p:ext>
+    </p:extLst>
+  </p:cSld>
+  <p:clrMapOvr>
+    <a:masterClrMapping/>
+  </p:clrMapOvr>
+</p:sld>
+</file>
+
 <file path=ppt/slides/slide2.xml><?xml version="1.0" encoding="utf-8"?>
 <p:sld xmlns:a="http://schemas.openxmlformats.org/drawingml/2006/main" xmlns:r="http://schemas.openxmlformats.org/officeDocument/2006/relationships" xmlns:p="http://schemas.openxmlformats.org/presentationml/2006/main">
   <p:cSld>
@@ -4658,153 +4736,6 @@
     <p:extLst>
       <p:ext uri="{BB962C8B-B14F-4D97-AF65-F5344CB8AC3E}">
         <p14:creationId xmlns:p14="http://schemas.microsoft.com/office/powerpoint/2010/main" val="3805459270"/>
-      </p:ext>
-    </p:extLst>
-  </p:cSld>
-  <p:clrMapOvr>
-    <a:masterClrMapping/>
-  </p:clrMapOvr>
-</p:sld>
-</file>
-
-<file path=ppt/slides/slide20.xml><?xml version="1.0" encoding="utf-8"?>
-<p:sld xmlns:a="http://schemas.openxmlformats.org/drawingml/2006/main" xmlns:r="http://schemas.openxmlformats.org/officeDocument/2006/relationships" xmlns:p="http://schemas.openxmlformats.org/presentationml/2006/main">
-  <p:cSld>
-    <p:spTree>
-      <p:nvGrpSpPr>
-        <p:cNvPr id="1" name=""/>
-        <p:cNvGrpSpPr/>
-        <p:nvPr/>
-      </p:nvGrpSpPr>
-      <p:grpSpPr>
-        <a:xfrm>
-          <a:off x="0" y="0"/>
-          <a:ext cx="0" cy="0"/>
-          <a:chOff x="0" y="0"/>
-          <a:chExt cx="0" cy="0"/>
-        </a:xfrm>
-      </p:grpSpPr>
-      <p:sp>
-        <p:nvSpPr>
-          <p:cNvPr id="2" name="Title 1"/>
-          <p:cNvSpPr>
-            <a:spLocks noGrp="1"/>
-          </p:cNvSpPr>
-          <p:nvPr>
-            <p:ph type="title"/>
-          </p:nvPr>
-        </p:nvSpPr>
-        <p:spPr/>
-        <p:txBody>
-          <a:bodyPr/>
-          <a:lstStyle/>
-          <a:p>
-            <a:endParaRPr lang="bg-BG"/>
-          </a:p>
-        </p:txBody>
-      </p:sp>
-      <p:sp>
-        <p:nvSpPr>
-          <p:cNvPr id="3" name="Content Placeholder 2"/>
-          <p:cNvSpPr>
-            <a:spLocks noGrp="1"/>
-          </p:cNvSpPr>
-          <p:nvPr>
-            <p:ph idx="1"/>
-          </p:nvPr>
-        </p:nvSpPr>
-        <p:spPr/>
-        <p:txBody>
-          <a:bodyPr/>
-          <a:lstStyle/>
-          <a:p>
-            <a:endParaRPr lang="bg-BG"/>
-          </a:p>
-        </p:txBody>
-      </p:sp>
-      <p:pic>
-        <p:nvPicPr>
-          <p:cNvPr id="3074" name="Picture 2" descr="Related image"/>
-          <p:cNvPicPr>
-            <a:picLocks noChangeAspect="1" noChangeArrowheads="1"/>
-          </p:cNvPicPr>
-          <p:nvPr/>
-        </p:nvPicPr>
-        <p:blipFill>
-          <a:blip r:embed="rId2">
-            <a:extLst>
-              <a:ext uri="{28A0092B-C50C-407E-A947-70E740481C1C}">
-                <a14:useLocalDpi xmlns:a14="http://schemas.microsoft.com/office/drawing/2010/main" val="0"/>
-              </a:ext>
-            </a:extLst>
-          </a:blip>
-          <a:srcRect/>
-          <a:stretch>
-            <a:fillRect/>
-          </a:stretch>
-        </p:blipFill>
-        <p:spPr bwMode="auto">
-          <a:xfrm>
-            <a:off x="381000" y="597605"/>
-            <a:ext cx="11430000" cy="5962650"/>
-          </a:xfrm>
-          <a:prstGeom prst="rect">
-            <a:avLst/>
-          </a:prstGeom>
-          <a:extLst>
-            <a:ext uri="{909E8E84-426E-40DD-AFC4-6F175D3DCCD1}">
-              <a14:hiddenFill xmlns:a14="http://schemas.microsoft.com/office/drawing/2010/main">
-                <a:solidFill>
-                  <a:srgbClr val="FFFFFF"/>
-                </a:solidFill>
-              </a14:hiddenFill>
-            </a:ext>
-          </a:extLst>
-        </p:spPr>
-      </p:pic>
-      <p:sp>
-        <p:nvSpPr>
-          <p:cNvPr id="4" name="TextBox 3"/>
-          <p:cNvSpPr txBox="1"/>
-          <p:nvPr/>
-        </p:nvSpPr>
-        <p:spPr>
-          <a:xfrm>
-            <a:off x="2171700" y="1090523"/>
-            <a:ext cx="7162800" cy="1200329"/>
-          </a:xfrm>
-          <a:prstGeom prst="rect">
-            <a:avLst/>
-          </a:prstGeom>
-          <a:noFill/>
-        </p:spPr>
-        <p:txBody>
-          <a:bodyPr wrap="square" rtlCol="0">
-            <a:spAutoFit/>
-          </a:bodyPr>
-          <a:lstStyle/>
-          <a:p>
-            <a:pPr algn="ctr"/>
-            <a:r>
-              <a:rPr lang="en-US" sz="7200" dirty="0" smtClean="0">
-                <a:solidFill>
-                  <a:schemeClr val="bg1"/>
-                </a:solidFill>
-              </a:rPr>
-              <a:t>Thank you!</a:t>
-            </a:r>
-            <a:endParaRPr lang="bg-BG" sz="7200" dirty="0">
-              <a:solidFill>
-                <a:schemeClr val="bg1"/>
-              </a:solidFill>
-            </a:endParaRPr>
-          </a:p>
-        </p:txBody>
-      </p:sp>
-    </p:spTree>
-    <p:extLst>
-      <p:ext uri="{BB962C8B-B14F-4D97-AF65-F5344CB8AC3E}">
-        <p14:creationId xmlns:p14="http://schemas.microsoft.com/office/powerpoint/2010/main" val="2704833015"/>
       </p:ext>
     </p:extLst>
   </p:cSld>
@@ -4871,7 +4802,17 @@
           <a:p>
             <a:r>
               <a:rPr lang="en-US" dirty="0" smtClean="0"/>
-              <a:t>To predict the medal winners in the men’s event at the 2018 Olympics in </a:t>
+              <a:t>To observe each of the competitors ranked top 10 in the world’s scoring trends and potential </a:t>
+            </a:r>
+          </a:p>
+          <a:p>
+            <a:r>
+              <a:rPr lang="en-US" dirty="0" smtClean="0"/>
+              <a:t>To </a:t>
+            </a:r>
+            <a:r>
+              <a:rPr lang="en-US" dirty="0" smtClean="0"/>
+              <a:t>predict the medal winners in the men’s event at the 2018 Olympics in </a:t>
             </a:r>
             <a:r>
               <a:rPr lang="en-US" dirty="0" err="1" smtClean="0"/>
@@ -4879,8 +4820,21 @@
             </a:r>
             <a:r>
               <a:rPr lang="en-US" dirty="0" smtClean="0"/>
-              <a:t>  by analyzing data about the performance and scores over the last two (2016/2017 and 2017/2018) figure skating seasons of the skaters ranked top 10 in the world by the International Skating Union</a:t>
-            </a:r>
+              <a:t>  </a:t>
+            </a:r>
+          </a:p>
+          <a:p>
+            <a:r>
+              <a:rPr lang="en-US" dirty="0" smtClean="0"/>
+              <a:t>Through</a:t>
+            </a:r>
+            <a:r>
+              <a:rPr lang="en-US" dirty="0" smtClean="0"/>
+              <a:t> an analysis of figure skating scores over the last two (2016/2017 and 2017/2018) figure skating seasons, published by the International Skating Union</a:t>
+            </a:r>
+          </a:p>
+          <a:p>
+            <a:endParaRPr lang="en-US" dirty="0" smtClean="0"/>
           </a:p>
         </p:txBody>
       </p:sp>
@@ -5074,7 +5028,11 @@
           <a:p>
             <a:r>
               <a:rPr lang="en-US" dirty="0" smtClean="0"/>
-              <a:t>Scrapable ISU protocols data on: </a:t>
+              <a:t>Scraping-friendly </a:t>
+            </a:r>
+            <a:r>
+              <a:rPr lang="en-US" dirty="0" smtClean="0"/>
+              <a:t>ISU protocols data on: </a:t>
             </a:r>
             <a:r>
               <a:rPr lang="en-US" dirty="0" smtClean="0">
@@ -5289,11 +5247,11 @@
           <a:p>
             <a:r>
               <a:rPr lang="en-US" dirty="0" smtClean="0"/>
-              <a:t>Methods: </a:t>
-            </a:r>
-            <a:r>
-              <a:rPr lang="en-US" dirty="0" smtClean="0"/>
-              <a:t>Plotting skaters data</a:t>
+              <a:t>Methods: Plotting </a:t>
+            </a:r>
+            <a:r>
+              <a:rPr lang="en-US" dirty="0" smtClean="0"/>
+              <a:t>Strengths and Weaknesses</a:t>
             </a:r>
             <a:endParaRPr lang="bg-BG" dirty="0"/>
           </a:p>
@@ -5316,7 +5274,7 @@
           <a:p>
             <a:r>
               <a:rPr lang="en-US" dirty="0" smtClean="0"/>
-              <a:t>Comparison of top 10 skaters strengths and weaknesses</a:t>
+              <a:t>Short program vs long program score</a:t>
             </a:r>
             <a:endParaRPr lang="bg-BG" dirty="0"/>
           </a:p>
@@ -5324,22 +5282,28 @@
       </p:sp>
       <p:pic>
         <p:nvPicPr>
-          <p:cNvPr id="4" name="Picture 3"/>
+          <p:cNvPr id="5" name="Picture 4"/>
           <p:cNvPicPr>
             <a:picLocks noChangeAspect="1"/>
           </p:cNvPicPr>
           <p:nvPr/>
         </p:nvPicPr>
         <p:blipFill>
-          <a:blip r:embed="rId2"/>
+          <a:blip r:embed="rId2">
+            <a:extLst>
+              <a:ext uri="{28A0092B-C50C-407E-A947-70E740481C1C}">
+                <a14:useLocalDpi xmlns:a14="http://schemas.microsoft.com/office/drawing/2010/main" val="0"/>
+              </a:ext>
+            </a:extLst>
+          </a:blip>
           <a:stretch>
             <a:fillRect/>
           </a:stretch>
         </p:blipFill>
         <p:spPr>
           <a:xfrm>
-            <a:off x="2722239" y="2263135"/>
-            <a:ext cx="5852172" cy="4389129"/>
+            <a:off x="3160770" y="2460575"/>
+            <a:ext cx="5870460" cy="3986792"/>
           </a:xfrm>
           <a:prstGeom prst="rect">
             <a:avLst/>
@@ -5391,6 +5355,14 @@
           <a:bodyPr/>
           <a:lstStyle/>
           <a:p>
+            <a:r>
+              <a:rPr lang="en-US" dirty="0" smtClean="0"/>
+              <a:t>Methods: Plotting </a:t>
+            </a:r>
+            <a:r>
+              <a:rPr lang="en-US" dirty="0" smtClean="0"/>
+              <a:t>Strengths and Weaknesses</a:t>
+            </a:r>
             <a:endParaRPr lang="bg-BG" dirty="0"/>
           </a:p>
         </p:txBody>
@@ -5410,6 +5382,10 @@
           <a:bodyPr/>
           <a:lstStyle/>
           <a:p>
+            <a:r>
+              <a:rPr lang="en-US" dirty="0" smtClean="0"/>
+              <a:t>Long program technical mark vs long program component mark</a:t>
+            </a:r>
             <a:endParaRPr lang="bg-BG" dirty="0"/>
           </a:p>
         </p:txBody>
@@ -5423,39 +5399,21 @@
           <p:nvPr/>
         </p:nvPicPr>
         <p:blipFill>
-          <a:blip r:embed="rId2"/>
+          <a:blip r:embed="rId2">
+            <a:extLst>
+              <a:ext uri="{28A0092B-C50C-407E-A947-70E740481C1C}">
+                <a14:useLocalDpi xmlns:a14="http://schemas.microsoft.com/office/drawing/2010/main" val="0"/>
+              </a:ext>
+            </a:extLst>
+          </a:blip>
           <a:stretch>
             <a:fillRect/>
           </a:stretch>
         </p:blipFill>
         <p:spPr>
           <a:xfrm>
-            <a:off x="352805" y="1042988"/>
-            <a:ext cx="5499953" cy="4124965"/>
-          </a:xfrm>
-          <a:prstGeom prst="rect">
-            <a:avLst/>
-          </a:prstGeom>
-        </p:spPr>
-      </p:pic>
-      <p:pic>
-        <p:nvPicPr>
-          <p:cNvPr id="5" name="Picture 4"/>
-          <p:cNvPicPr>
-            <a:picLocks noChangeAspect="1"/>
-          </p:cNvPicPr>
-          <p:nvPr/>
-        </p:nvPicPr>
-        <p:blipFill>
-          <a:blip r:embed="rId3"/>
-          <a:stretch>
-            <a:fillRect/>
-          </a:stretch>
-        </p:blipFill>
-        <p:spPr>
-          <a:xfrm>
-            <a:off x="5900383" y="1042988"/>
-            <a:ext cx="5501042" cy="4125781"/>
+            <a:off x="3055614" y="2443137"/>
+            <a:ext cx="6080772" cy="3986792"/>
           </a:xfrm>
           <a:prstGeom prst="rect">
             <a:avLst/>
@@ -5465,7 +5423,7 @@
     </p:spTree>
     <p:extLst>
       <p:ext uri="{BB962C8B-B14F-4D97-AF65-F5344CB8AC3E}">
-        <p14:creationId xmlns:p14="http://schemas.microsoft.com/office/powerpoint/2010/main" val="3375509347"/>
+        <p14:creationId xmlns:p14="http://schemas.microsoft.com/office/powerpoint/2010/main" val="1005586917"/>
       </p:ext>
     </p:extLst>
   </p:cSld>
@@ -5507,32 +5465,17 @@
           <a:bodyPr/>
           <a:lstStyle/>
           <a:p>
-            <a:endParaRPr lang="bg-BG"/>
-          </a:p>
-        </p:txBody>
-      </p:sp>
-      <p:sp>
-        <p:nvSpPr>
-          <p:cNvPr id="3" name="Content Placeholder 2"/>
-          <p:cNvSpPr>
-            <a:spLocks noGrp="1"/>
-          </p:cNvSpPr>
-          <p:nvPr>
-            <p:ph idx="1"/>
-          </p:nvPr>
-        </p:nvSpPr>
-        <p:spPr/>
-        <p:txBody>
-          <a:bodyPr/>
-          <a:lstStyle/>
-          <a:p>
-            <a:endParaRPr lang="bg-BG"/>
+            <a:r>
+              <a:rPr lang="en-US" dirty="0" smtClean="0"/>
+              <a:t>Methods: Box Plot</a:t>
+            </a:r>
+            <a:endParaRPr lang="bg-BG" dirty="0"/>
           </a:p>
         </p:txBody>
       </p:sp>
       <p:pic>
         <p:nvPicPr>
-          <p:cNvPr id="4" name="Picture 3"/>
+          <p:cNvPr id="3" name="Picture 2"/>
           <p:cNvPicPr>
             <a:picLocks noChangeAspect="1"/>
           </p:cNvPicPr>
@@ -5546,8 +5489,32 @@
         </p:blipFill>
         <p:spPr>
           <a:xfrm>
-            <a:off x="2960364" y="1147763"/>
-            <a:ext cx="5852172" cy="4389129"/>
+            <a:off x="904483" y="1690688"/>
+            <a:ext cx="5191517" cy="4306832"/>
+          </a:xfrm>
+          <a:prstGeom prst="rect">
+            <a:avLst/>
+          </a:prstGeom>
+        </p:spPr>
+      </p:pic>
+      <p:pic>
+        <p:nvPicPr>
+          <p:cNvPr id="8" name="Picture 7"/>
+          <p:cNvPicPr>
+            <a:picLocks noChangeAspect="1"/>
+          </p:cNvPicPr>
+          <p:nvPr/>
+        </p:nvPicPr>
+        <p:blipFill>
+          <a:blip r:embed="rId3"/>
+          <a:stretch>
+            <a:fillRect/>
+          </a:stretch>
+        </p:blipFill>
+        <p:spPr>
+          <a:xfrm>
+            <a:off x="6228566" y="1690688"/>
+            <a:ext cx="5191517" cy="4306832"/>
           </a:xfrm>
           <a:prstGeom prst="rect">
             <a:avLst/>
@@ -5557,7 +5524,7 @@
     </p:spTree>
     <p:extLst>
       <p:ext uri="{BB962C8B-B14F-4D97-AF65-F5344CB8AC3E}">
-        <p14:creationId xmlns:p14="http://schemas.microsoft.com/office/powerpoint/2010/main" val="2692348802"/>
+        <p14:creationId xmlns:p14="http://schemas.microsoft.com/office/powerpoint/2010/main" val="1707265198"/>
       </p:ext>
     </p:extLst>
   </p:cSld>

</xml_diff>